<commit_message>
Added screenshots of query
</commit_message>
<xml_diff>
--- a/Circle2_Linux_Git_Group_Assignment.pptx
+++ b/Circle2_Linux_Git_Group_Assignment.pptx
@@ -6,10 +6,14 @@
   </p:sldMasterIdLst>
   <p:sldIdLst>
     <p:sldId id="256" r:id="rId2"/>
-    <p:sldId id="257" r:id="rId3"/>
-    <p:sldId id="258" r:id="rId4"/>
-    <p:sldId id="259" r:id="rId5"/>
-    <p:sldId id="260" r:id="rId6"/>
+    <p:sldId id="261" r:id="rId3"/>
+    <p:sldId id="257" r:id="rId4"/>
+    <p:sldId id="262" r:id="rId5"/>
+    <p:sldId id="258" r:id="rId6"/>
+    <p:sldId id="263" r:id="rId7"/>
+    <p:sldId id="259" r:id="rId8"/>
+    <p:sldId id="264" r:id="rId9"/>
+    <p:sldId id="260" r:id="rId10"/>
   </p:sldIdLst>
   <p:sldSz cx="12192000" cy="6858000"/>
   <p:notesSz cx="6858000" cy="9144000"/>
@@ -114,9 +118,13 @@
         <p14:section name="Untitled Section" id="{DF937E92-E6E9-4796-A59C-6661AD7156B2}">
           <p14:sldIdLst>
             <p14:sldId id="256"/>
+            <p14:sldId id="261"/>
             <p14:sldId id="257"/>
+            <p14:sldId id="262"/>
             <p14:sldId id="258"/>
+            <p14:sldId id="263"/>
             <p14:sldId id="259"/>
+            <p14:sldId id="264"/>
             <p14:sldId id="260"/>
           </p14:sldIdLst>
         </p14:section>
@@ -5955,7 +5963,7 @@
           <p:cNvPr id="2" name="Title 1">
             <a:extLst>
               <a:ext uri="{FF2B5EF4-FFF2-40B4-BE49-F238E27FC236}">
-                <a16:creationId xmlns:a16="http://schemas.microsoft.com/office/drawing/2014/main" id="{EB3D3C0C-7271-220A-1471-DC23DB5CB7F9}"/>
+                <a16:creationId xmlns:a16="http://schemas.microsoft.com/office/drawing/2014/main" id="{3EFE87B8-37AE-DA45-7BDB-E2C801D959E3}"/>
               </a:ext>
             </a:extLst>
           </p:cNvPr>
@@ -5969,95 +5977,56 @@
         <p:spPr>
           <a:xfrm>
             <a:off x="677334" y="609600"/>
-            <a:ext cx="8596668" cy="836141"/>
+            <a:ext cx="8596668" cy="848497"/>
           </a:xfrm>
         </p:spPr>
         <p:txBody>
           <a:bodyPr/>
           <a:lstStyle/>
           <a:p>
-            <a:pPr algn="ctr"/>
             <a:r>
               <a:rPr lang="en-US" b="1" dirty="0"/>
-              <a:t>TOP ACCOUNTS</a:t>
-            </a:r>
-          </a:p>
-        </p:txBody>
-      </p:sp>
-      <p:sp>
-        <p:nvSpPr>
-          <p:cNvPr id="3" name="Content Placeholder 2">
+              <a:t>TOP ACCOUNTS PER REGION</a:t>
+            </a:r>
+          </a:p>
+        </p:txBody>
+      </p:sp>
+      <p:pic>
+        <p:nvPicPr>
+          <p:cNvPr id="11" name="Content Placeholder 10">
             <a:extLst>
               <a:ext uri="{FF2B5EF4-FFF2-40B4-BE49-F238E27FC236}">
-                <a16:creationId xmlns:a16="http://schemas.microsoft.com/office/drawing/2014/main" id="{0B19DDF0-91AC-4813-EEEB-8E72753D71A1}"/>
+                <a16:creationId xmlns:a16="http://schemas.microsoft.com/office/drawing/2014/main" id="{0B72459C-DA11-165C-749D-93B8FE1A1493}"/>
               </a:ext>
             </a:extLst>
           </p:cNvPr>
-          <p:cNvSpPr>
-            <a:spLocks noGrp="1"/>
-          </p:cNvSpPr>
+          <p:cNvPicPr>
+            <a:picLocks noGrp="1" noChangeAspect="1"/>
+          </p:cNvPicPr>
           <p:nvPr>
             <p:ph idx="1"/>
           </p:nvPr>
-        </p:nvSpPr>
+        </p:nvPicPr>
+        <p:blipFill>
+          <a:blip r:embed="rId2"/>
+          <a:stretch>
+            <a:fillRect/>
+          </a:stretch>
+        </p:blipFill>
         <p:spPr>
           <a:xfrm>
-            <a:off x="677334" y="1445741"/>
-            <a:ext cx="8596668" cy="4595621"/>
+            <a:off x="295754" y="1550773"/>
+            <a:ext cx="9481647" cy="3756453"/>
           </a:xfrm>
+          <a:prstGeom prst="rect">
+            <a:avLst/>
+          </a:prstGeom>
         </p:spPr>
-        <p:txBody>
-          <a:bodyPr/>
-          <a:lstStyle/>
-          <a:p>
-            <a:pPr algn="just"/>
-            <a:r>
-              <a:rPr lang="en-US" dirty="0"/>
-              <a:t>The top accounts patronizing the company are Pacific Life, Core Mark Holding, EOG Resources, DISH Network and Fidelity National Financial. </a:t>
-            </a:r>
-          </a:p>
-          <a:p>
-            <a:pPr algn="just"/>
-            <a:r>
-              <a:rPr lang="en-US" dirty="0"/>
-              <a:t>These accounts should be retained by launching retention offers </a:t>
-            </a:r>
-          </a:p>
-          <a:p>
-            <a:pPr algn="just"/>
-            <a:r>
-              <a:rPr lang="en-US" dirty="0"/>
-              <a:t>Solid customer relationship should be established with them to make sure whatever issues they main run into is promptly attended to.</a:t>
-            </a:r>
-          </a:p>
-          <a:p>
-            <a:pPr algn="just"/>
-            <a:r>
-              <a:rPr lang="en-US" dirty="0"/>
-              <a:t>For customers with low order frequency or those who have churned, a targeted campaign can bring them back.</a:t>
-            </a:r>
-          </a:p>
-          <a:p>
-            <a:pPr algn="just"/>
-            <a:r>
-              <a:rPr lang="en-US" dirty="0"/>
-              <a:t>Have your sales reps or account managers check in with these accounts, not just to sell, but to understand their needs and challenges. Use this information to offer solutions and build trust, which can lead to higher-value sales down the line.</a:t>
-            </a:r>
-          </a:p>
-          <a:p>
-            <a:pPr algn="just"/>
-            <a:endParaRPr lang="en-US" dirty="0"/>
-          </a:p>
-          <a:p>
-            <a:pPr algn="just"/>
-            <a:endParaRPr lang="en-US" dirty="0"/>
-          </a:p>
-        </p:txBody>
-      </p:sp>
+      </p:pic>
     </p:spTree>
     <p:extLst>
       <p:ext uri="{BB962C8B-B14F-4D97-AF65-F5344CB8AC3E}">
-        <p14:creationId xmlns:p14="http://schemas.microsoft.com/office/powerpoint/2010/main" val="639642543"/>
+        <p14:creationId xmlns:p14="http://schemas.microsoft.com/office/powerpoint/2010/main" val="2472377406"/>
       </p:ext>
     </p:extLst>
   </p:cSld>
@@ -6089,7 +6058,7 @@
           <p:cNvPr id="2" name="Title 1">
             <a:extLst>
               <a:ext uri="{FF2B5EF4-FFF2-40B4-BE49-F238E27FC236}">
-                <a16:creationId xmlns:a16="http://schemas.microsoft.com/office/drawing/2014/main" id="{9A2E025F-6EBC-A885-C740-2405DA7AA09C}"/>
+                <a16:creationId xmlns:a16="http://schemas.microsoft.com/office/drawing/2014/main" id="{EB3D3C0C-7271-220A-1471-DC23DB5CB7F9}"/>
               </a:ext>
             </a:extLst>
           </p:cNvPr>
@@ -6102,20 +6071,18 @@
         </p:nvSpPr>
         <p:spPr>
           <a:xfrm>
-            <a:off x="677334" y="609601"/>
-            <a:ext cx="8596668" cy="1058562"/>
+            <a:off x="677334" y="609600"/>
+            <a:ext cx="8596668" cy="836141"/>
           </a:xfrm>
         </p:spPr>
         <p:txBody>
-          <a:bodyPr>
-            <a:normAutofit fontScale="90000"/>
-          </a:bodyPr>
+          <a:bodyPr/>
           <a:lstStyle/>
           <a:p>
             <a:pPr algn="ctr"/>
             <a:r>
               <a:rPr lang="en-US" b="1" dirty="0"/>
-              <a:t>AMOUNT GENERATED PER WEB EVENT CHANNELS</a:t>
+              <a:t>INSIGHTS FROM TOP ACCOUNTS</a:t>
             </a:r>
           </a:p>
         </p:txBody>
@@ -6125,7 +6092,7 @@
           <p:cNvPr id="3" name="Content Placeholder 2">
             <a:extLst>
               <a:ext uri="{FF2B5EF4-FFF2-40B4-BE49-F238E27FC236}">
-                <a16:creationId xmlns:a16="http://schemas.microsoft.com/office/drawing/2014/main" id="{88D1811E-126C-23BB-00B6-859CCB84E437}"/>
+                <a16:creationId xmlns:a16="http://schemas.microsoft.com/office/drawing/2014/main" id="{0B19DDF0-91AC-4813-EEEB-8E72753D71A1}"/>
               </a:ext>
             </a:extLst>
           </p:cNvPr>
@@ -6138,15 +6105,17 @@
         </p:nvSpPr>
         <p:spPr>
           <a:xfrm>
-            <a:off x="677334" y="1865870"/>
-            <a:ext cx="8596668" cy="4670853"/>
+            <a:off x="677334" y="1297459"/>
+            <a:ext cx="8596668" cy="4436076"/>
           </a:xfrm>
         </p:spPr>
         <p:txBody>
-          <a:bodyPr/>
-          <a:lstStyle/>
-          <a:p>
-            <a:pPr marL="0" indent="0">
+          <a:bodyPr>
+            <a:normAutofit/>
+          </a:bodyPr>
+          <a:lstStyle/>
+          <a:p>
+            <a:pPr marL="0" indent="0" algn="just">
               <a:buNone/>
             </a:pPr>
             <a:endParaRPr lang="en-US" dirty="0"/>
@@ -6155,53 +6124,51 @@
             <a:pPr algn="just"/>
             <a:r>
               <a:rPr lang="en-US" dirty="0"/>
-              <a:t>The "</a:t>
-            </a:r>
-            <a:r>
-              <a:rPr lang="en-US" b="1" dirty="0"/>
-              <a:t>direct</a:t>
-            </a:r>
+              <a:t>The top accounts patronizing the company are Pacific Life, Core Mark Holding, EOG Resources, DISH Network and Fidelity National Financial. </a:t>
+            </a:r>
+          </a:p>
+          <a:p>
+            <a:pPr algn="just"/>
             <a:r>
               <a:rPr lang="en-US" dirty="0"/>
-              <a:t>" channel is the most effective and profitable, accounting for a massive 195,236 orders. This signifies that a large portion of customers are either loyal, already familiar with the company, or actively seeking it out by directly visiting the website. This suggests strong brand recognition or customer loyalty.</a:t>
+              <a:t>These accounts should be retained by launching retention offers </a:t>
             </a:r>
           </a:p>
           <a:p>
             <a:pPr algn="just"/>
             <a:r>
-              <a:rPr lang="en-US" b="1" dirty="0"/>
-              <a:t>Facebook</a:t>
-            </a:r>
-            <a:r>
               <a:rPr lang="en-US" dirty="0"/>
-              <a:t> is the second most successful channel, with 32,251 orders. While it's a distant second to the direct channel, its contribution is still substantial, indicating that social media marketing on Facebook is a highly effective way to drive sales.</a:t>
+              <a:t>Solid customer relationship should be established with them to make sure whatever issues they main run into is promptly attended to.</a:t>
             </a:r>
           </a:p>
           <a:p>
             <a:pPr algn="just"/>
             <a:r>
-              <a:rPr lang="en-US" b="1" dirty="0"/>
-              <a:t>Twitter</a:t>
-            </a:r>
-            <a:r>
               <a:rPr lang="en-US" dirty="0"/>
-              <a:t> and </a:t>
-            </a:r>
-            <a:r>
-              <a:rPr lang="en-US" b="1" dirty="0"/>
-              <a:t>banner</a:t>
-            </a:r>
+              <a:t>For customers with low order frequency or those who have churned, a targeted campaign can bring them back.</a:t>
+            </a:r>
+          </a:p>
+          <a:p>
+            <a:pPr algn="just"/>
             <a:r>
               <a:rPr lang="en-US" dirty="0"/>
-              <a:t> channels brought in the lowest sales. This indicates that the company's marketing efforts or presence on these platforms are not as effective at converting to sales compared to direct traffic and Facebook.</a:t>
-            </a:r>
+              <a:t>Have your sales reps or account managers check in with these accounts, not just to sell, but to understand their needs and challenges. Use this information to offer solutions and build trust, which can lead to higher-value sales down the line.</a:t>
+            </a:r>
+          </a:p>
+          <a:p>
+            <a:pPr algn="just"/>
+            <a:endParaRPr lang="en-US" dirty="0"/>
+          </a:p>
+          <a:p>
+            <a:pPr algn="just"/>
+            <a:endParaRPr lang="en-US" dirty="0"/>
           </a:p>
         </p:txBody>
       </p:sp>
     </p:spTree>
     <p:extLst>
       <p:ext uri="{BB962C8B-B14F-4D97-AF65-F5344CB8AC3E}">
-        <p14:creationId xmlns:p14="http://schemas.microsoft.com/office/powerpoint/2010/main" val="1499926794"/>
+        <p14:creationId xmlns:p14="http://schemas.microsoft.com/office/powerpoint/2010/main" val="639642543"/>
       </p:ext>
     </p:extLst>
   </p:cSld>
@@ -6233,7 +6200,7 @@
           <p:cNvPr id="2" name="Title 1">
             <a:extLst>
               <a:ext uri="{FF2B5EF4-FFF2-40B4-BE49-F238E27FC236}">
-                <a16:creationId xmlns:a16="http://schemas.microsoft.com/office/drawing/2014/main" id="{94CE1159-33C2-909B-A4AB-30E21FE1CBC8}"/>
+                <a16:creationId xmlns:a16="http://schemas.microsoft.com/office/drawing/2014/main" id="{8C6BF2F7-FCD1-5FFB-1FB6-E4F320B5333F}"/>
               </a:ext>
             </a:extLst>
           </p:cNvPr>
@@ -6247,143 +6214,55 @@
         <p:spPr>
           <a:xfrm>
             <a:off x="677334" y="609600"/>
-            <a:ext cx="8596668" cy="1046205"/>
+            <a:ext cx="8596668" cy="1219200"/>
           </a:xfrm>
         </p:spPr>
         <p:txBody>
-          <a:bodyPr>
-            <a:normAutofit fontScale="90000"/>
-          </a:bodyPr>
+          <a:bodyPr/>
           <a:lstStyle/>
           <a:p>
             <a:pPr algn="ctr"/>
             <a:r>
               <a:rPr lang="en-US" b="1" dirty="0"/>
-              <a:t>ACCOUNTS WITH THE HIGHEST ORDERS AMOUNT FROM WEB EVENTS</a:t>
-            </a:r>
-          </a:p>
-        </p:txBody>
-      </p:sp>
-      <p:sp>
-        <p:nvSpPr>
-          <p:cNvPr id="3" name="Content Placeholder 2">
+              <a:t>AMOUNT GENERATED PER WEB EVENT CHANNELS</a:t>
+            </a:r>
+            <a:endParaRPr lang="en-US" dirty="0"/>
+          </a:p>
+        </p:txBody>
+      </p:sp>
+      <p:pic>
+        <p:nvPicPr>
+          <p:cNvPr id="5" name="Content Placeholder 4">
             <a:extLst>
               <a:ext uri="{FF2B5EF4-FFF2-40B4-BE49-F238E27FC236}">
-                <a16:creationId xmlns:a16="http://schemas.microsoft.com/office/drawing/2014/main" id="{7E6F698F-F453-06A5-F60F-3D960F38F2F9}"/>
+                <a16:creationId xmlns:a16="http://schemas.microsoft.com/office/drawing/2014/main" id="{B83612AD-B204-A4C9-C9A7-A582358039A3}"/>
               </a:ext>
             </a:extLst>
           </p:cNvPr>
-          <p:cNvSpPr>
-            <a:spLocks noGrp="1"/>
-          </p:cNvSpPr>
+          <p:cNvPicPr>
+            <a:picLocks noGrp="1" noChangeAspect="1"/>
+          </p:cNvPicPr>
           <p:nvPr>
             <p:ph idx="1"/>
           </p:nvPr>
-        </p:nvSpPr>
+        </p:nvPicPr>
+        <p:blipFill>
+          <a:blip r:embed="rId2"/>
+          <a:stretch>
+            <a:fillRect/>
+          </a:stretch>
+        </p:blipFill>
         <p:spPr>
           <a:xfrm>
-            <a:off x="677334" y="1779373"/>
-            <a:ext cx="8596668" cy="4261990"/>
+            <a:off x="951469" y="1828800"/>
+            <a:ext cx="8254599" cy="4419600"/>
           </a:xfrm>
         </p:spPr>
-        <p:txBody>
-          <a:bodyPr/>
-          <a:lstStyle/>
-          <a:p>
-            <a:pPr algn="just"/>
-            <a:r>
-              <a:rPr lang="en-US" dirty="0"/>
-              <a:t>EOG Resources stands out as the single most valuable customer, with a total order amount of over $34 million. While their number of web events (5,518) is not significantly higher than the others on the list, their spending is in a class of its own. This indicates that their orders are of a much larger average size or value compared to the other top accounts.</a:t>
-            </a:r>
-          </a:p>
-          <a:p>
-            <a:pPr algn="just"/>
-            <a:r>
-              <a:rPr lang="en-US" dirty="0"/>
-              <a:t>The accounts </a:t>
-            </a:r>
-            <a:r>
-              <a:rPr lang="en-US" b="1" dirty="0"/>
-              <a:t>Mosaic</a:t>
-            </a:r>
-            <a:r>
-              <a:rPr lang="en-US" dirty="0"/>
-              <a:t>, </a:t>
-            </a:r>
-            <a:r>
-              <a:rPr lang="en-US" b="1" dirty="0"/>
-              <a:t>General Dynamics</a:t>
-            </a:r>
-            <a:r>
-              <a:rPr lang="en-US" dirty="0"/>
-              <a:t>, </a:t>
-            </a:r>
-            <a:r>
-              <a:rPr lang="en-US" b="1" dirty="0"/>
-              <a:t>Leucadia National</a:t>
-            </a:r>
-            <a:r>
-              <a:rPr lang="en-US" dirty="0"/>
-              <a:t>, and </a:t>
-            </a:r>
-            <a:r>
-              <a:rPr lang="en-US" b="1" dirty="0"/>
-              <a:t>Arrow Electronics</a:t>
-            </a:r>
-            <a:r>
-              <a:rPr lang="en-US" dirty="0"/>
-              <a:t> all show a similar pattern:</a:t>
-            </a:r>
-          </a:p>
-          <a:p>
-            <a:pPr algn="just">
-              <a:buFont typeface="Arial" panose="020B0604020202020204" pitchFamily="34" charset="0"/>
-              <a:buChar char="•"/>
-            </a:pPr>
-            <a:r>
-              <a:rPr lang="en-US" dirty="0"/>
-              <a:t>Their total order amounts are all in the range of </a:t>
-            </a:r>
-            <a:r>
-              <a:rPr lang="en-US" b="1" dirty="0"/>
-              <a:t>$21 million to $28 million</a:t>
-            </a:r>
-            <a:r>
-              <a:rPr lang="en-US" dirty="0"/>
-              <a:t>.</a:t>
-            </a:r>
-          </a:p>
-          <a:p>
-            <a:pPr algn="just">
-              <a:buFont typeface="Arial" panose="020B0604020202020204" pitchFamily="34" charset="0"/>
-              <a:buChar char="•"/>
-            </a:pPr>
-            <a:r>
-              <a:rPr lang="en-US" dirty="0"/>
-              <a:t>Their number of web events are also closely clustered, ranging from just over 5,000 to just under 5,500.</a:t>
-            </a:r>
-          </a:p>
-          <a:p>
-            <a:pPr algn="just"/>
-            <a:r>
-              <a:rPr lang="en-US" dirty="0"/>
-              <a:t>This suggests that these are all major, high-value clients with a similar buying and engagement behavior. They are very active online and generate significant revenue.</a:t>
-            </a:r>
-          </a:p>
-          <a:p>
-            <a:pPr algn="just"/>
-            <a:endParaRPr lang="en-US" dirty="0"/>
-          </a:p>
-          <a:p>
-            <a:pPr algn="just"/>
-            <a:endParaRPr lang="en-US" dirty="0"/>
-          </a:p>
-        </p:txBody>
-      </p:sp>
+      </p:pic>
     </p:spTree>
     <p:extLst>
       <p:ext uri="{BB962C8B-B14F-4D97-AF65-F5344CB8AC3E}">
-        <p14:creationId xmlns:p14="http://schemas.microsoft.com/office/powerpoint/2010/main" val="1335898808"/>
+        <p14:creationId xmlns:p14="http://schemas.microsoft.com/office/powerpoint/2010/main" val="3564727884"/>
       </p:ext>
     </p:extLst>
   </p:cSld>
@@ -6415,6 +6294,508 @@
           <p:cNvPr id="2" name="Title 1">
             <a:extLst>
               <a:ext uri="{FF2B5EF4-FFF2-40B4-BE49-F238E27FC236}">
+                <a16:creationId xmlns:a16="http://schemas.microsoft.com/office/drawing/2014/main" id="{9A2E025F-6EBC-A885-C740-2405DA7AA09C}"/>
+              </a:ext>
+            </a:extLst>
+          </p:cNvPr>
+          <p:cNvSpPr>
+            <a:spLocks noGrp="1"/>
+          </p:cNvSpPr>
+          <p:nvPr>
+            <p:ph type="title"/>
+          </p:nvPr>
+        </p:nvSpPr>
+        <p:spPr>
+          <a:xfrm>
+            <a:off x="677334" y="609601"/>
+            <a:ext cx="8596668" cy="1058562"/>
+          </a:xfrm>
+        </p:spPr>
+        <p:txBody>
+          <a:bodyPr>
+            <a:normAutofit fontScale="90000"/>
+          </a:bodyPr>
+          <a:lstStyle/>
+          <a:p>
+            <a:pPr algn="ctr"/>
+            <a:r>
+              <a:rPr lang="en-US" b="1" dirty="0"/>
+              <a:t>INSIGHTS FROM AMOUNT GENERATED PER WEB EVENT CHANNELS</a:t>
+            </a:r>
+          </a:p>
+        </p:txBody>
+      </p:sp>
+      <p:sp>
+        <p:nvSpPr>
+          <p:cNvPr id="3" name="Content Placeholder 2">
+            <a:extLst>
+              <a:ext uri="{FF2B5EF4-FFF2-40B4-BE49-F238E27FC236}">
+                <a16:creationId xmlns:a16="http://schemas.microsoft.com/office/drawing/2014/main" id="{88D1811E-126C-23BB-00B6-859CCB84E437}"/>
+              </a:ext>
+            </a:extLst>
+          </p:cNvPr>
+          <p:cNvSpPr>
+            <a:spLocks noGrp="1"/>
+          </p:cNvSpPr>
+          <p:nvPr>
+            <p:ph idx="1"/>
+          </p:nvPr>
+        </p:nvSpPr>
+        <p:spPr>
+          <a:xfrm>
+            <a:off x="677334" y="1865870"/>
+            <a:ext cx="8596668" cy="4670853"/>
+          </a:xfrm>
+        </p:spPr>
+        <p:txBody>
+          <a:bodyPr/>
+          <a:lstStyle/>
+          <a:p>
+            <a:pPr marL="0" indent="0">
+              <a:buNone/>
+            </a:pPr>
+            <a:endParaRPr lang="en-US" dirty="0"/>
+          </a:p>
+          <a:p>
+            <a:pPr algn="just"/>
+            <a:r>
+              <a:rPr lang="en-US" dirty="0"/>
+              <a:t>The "</a:t>
+            </a:r>
+            <a:r>
+              <a:rPr lang="en-US" b="1" dirty="0"/>
+              <a:t>direct</a:t>
+            </a:r>
+            <a:r>
+              <a:rPr lang="en-US" dirty="0"/>
+              <a:t>" channel is the most effective and profitable, accounting for a massive 195,236 orders. This signifies that a large portion of customers are either loyal, already familiar with the company, or actively seeking it out by directly visiting the website. This suggests strong brand recognition or customer loyalty.</a:t>
+            </a:r>
+          </a:p>
+          <a:p>
+            <a:pPr algn="just"/>
+            <a:r>
+              <a:rPr lang="en-US" b="1" dirty="0"/>
+              <a:t>Facebook</a:t>
+            </a:r>
+            <a:r>
+              <a:rPr lang="en-US" dirty="0"/>
+              <a:t> is the second most successful channel, with 32,251 orders. While it's a distant second to the direct channel, its contribution is still substantial, indicating that social media marketing on Facebook is a highly effective way to drive sales.</a:t>
+            </a:r>
+          </a:p>
+          <a:p>
+            <a:pPr algn="just"/>
+            <a:r>
+              <a:rPr lang="en-US" b="1" dirty="0"/>
+              <a:t>Twitter</a:t>
+            </a:r>
+            <a:r>
+              <a:rPr lang="en-US" dirty="0"/>
+              <a:t> and </a:t>
+            </a:r>
+            <a:r>
+              <a:rPr lang="en-US" b="1" dirty="0"/>
+              <a:t>banner</a:t>
+            </a:r>
+            <a:r>
+              <a:rPr lang="en-US" dirty="0"/>
+              <a:t> channels brought in the lowest sales. This indicates that the company's marketing efforts or presence on these platforms are not as effective at converting to sales compared to direct traffic and Facebook.</a:t>
+            </a:r>
+          </a:p>
+        </p:txBody>
+      </p:sp>
+    </p:spTree>
+    <p:extLst>
+      <p:ext uri="{BB962C8B-B14F-4D97-AF65-F5344CB8AC3E}">
+        <p14:creationId xmlns:p14="http://schemas.microsoft.com/office/powerpoint/2010/main" val="1499926794"/>
+      </p:ext>
+    </p:extLst>
+  </p:cSld>
+  <p:clrMapOvr>
+    <a:masterClrMapping/>
+  </p:clrMapOvr>
+</p:sld>
+</file>
+
+<file path=ppt/slides/slide6.xml><?xml version="1.0" encoding="utf-8"?>
+<p:sld xmlns:a="http://schemas.openxmlformats.org/drawingml/2006/main" xmlns:r="http://schemas.openxmlformats.org/officeDocument/2006/relationships" xmlns:p="http://schemas.openxmlformats.org/presentationml/2006/main">
+  <p:cSld>
+    <p:spTree>
+      <p:nvGrpSpPr>
+        <p:cNvPr id="1" name=""/>
+        <p:cNvGrpSpPr/>
+        <p:nvPr/>
+      </p:nvGrpSpPr>
+      <p:grpSpPr>
+        <a:xfrm>
+          <a:off x="0" y="0"/>
+          <a:ext cx="0" cy="0"/>
+          <a:chOff x="0" y="0"/>
+          <a:chExt cx="0" cy="0"/>
+        </a:xfrm>
+      </p:grpSpPr>
+      <p:sp>
+        <p:nvSpPr>
+          <p:cNvPr id="2" name="Title 1">
+            <a:extLst>
+              <a:ext uri="{FF2B5EF4-FFF2-40B4-BE49-F238E27FC236}">
+                <a16:creationId xmlns:a16="http://schemas.microsoft.com/office/drawing/2014/main" id="{8735C928-842E-CD79-CE8A-71287F985EFF}"/>
+              </a:ext>
+            </a:extLst>
+          </p:cNvPr>
+          <p:cNvSpPr>
+            <a:spLocks noGrp="1"/>
+          </p:cNvSpPr>
+          <p:nvPr>
+            <p:ph type="title"/>
+          </p:nvPr>
+        </p:nvSpPr>
+        <p:spPr/>
+        <p:txBody>
+          <a:bodyPr/>
+          <a:lstStyle/>
+          <a:p>
+            <a:r>
+              <a:rPr lang="en-US" b="1" dirty="0"/>
+              <a:t>ACCOUNTS WITH THE HIGHEST ORDERS AMOUNT FROM WEB EVENTS</a:t>
+            </a:r>
+            <a:endParaRPr lang="en-US" dirty="0"/>
+          </a:p>
+        </p:txBody>
+      </p:sp>
+      <p:pic>
+        <p:nvPicPr>
+          <p:cNvPr id="5" name="Content Placeholder 4">
+            <a:extLst>
+              <a:ext uri="{FF2B5EF4-FFF2-40B4-BE49-F238E27FC236}">
+                <a16:creationId xmlns:a16="http://schemas.microsoft.com/office/drawing/2014/main" id="{6929B5A2-F09F-44AA-C66F-03416E3B7717}"/>
+              </a:ext>
+            </a:extLst>
+          </p:cNvPr>
+          <p:cNvPicPr>
+            <a:picLocks noGrp="1" noChangeAspect="1"/>
+          </p:cNvPicPr>
+          <p:nvPr>
+            <p:ph idx="1"/>
+          </p:nvPr>
+        </p:nvPicPr>
+        <p:blipFill>
+          <a:blip r:embed="rId2"/>
+          <a:stretch>
+            <a:fillRect/>
+          </a:stretch>
+        </p:blipFill>
+        <p:spPr>
+          <a:xfrm>
+            <a:off x="677334" y="2343588"/>
+            <a:ext cx="9072147" cy="3252649"/>
+          </a:xfrm>
+        </p:spPr>
+      </p:pic>
+    </p:spTree>
+    <p:extLst>
+      <p:ext uri="{BB962C8B-B14F-4D97-AF65-F5344CB8AC3E}">
+        <p14:creationId xmlns:p14="http://schemas.microsoft.com/office/powerpoint/2010/main" val="1321215192"/>
+      </p:ext>
+    </p:extLst>
+  </p:cSld>
+  <p:clrMapOvr>
+    <a:masterClrMapping/>
+  </p:clrMapOvr>
+</p:sld>
+</file>
+
+<file path=ppt/slides/slide7.xml><?xml version="1.0" encoding="utf-8"?>
+<p:sld xmlns:a="http://schemas.openxmlformats.org/drawingml/2006/main" xmlns:r="http://schemas.openxmlformats.org/officeDocument/2006/relationships" xmlns:p="http://schemas.openxmlformats.org/presentationml/2006/main">
+  <p:cSld>
+    <p:spTree>
+      <p:nvGrpSpPr>
+        <p:cNvPr id="1" name=""/>
+        <p:cNvGrpSpPr/>
+        <p:nvPr/>
+      </p:nvGrpSpPr>
+      <p:grpSpPr>
+        <a:xfrm>
+          <a:off x="0" y="0"/>
+          <a:ext cx="0" cy="0"/>
+          <a:chOff x="0" y="0"/>
+          <a:chExt cx="0" cy="0"/>
+        </a:xfrm>
+      </p:grpSpPr>
+      <p:sp>
+        <p:nvSpPr>
+          <p:cNvPr id="2" name="Title 1">
+            <a:extLst>
+              <a:ext uri="{FF2B5EF4-FFF2-40B4-BE49-F238E27FC236}">
+                <a16:creationId xmlns:a16="http://schemas.microsoft.com/office/drawing/2014/main" id="{94CE1159-33C2-909B-A4AB-30E21FE1CBC8}"/>
+              </a:ext>
+            </a:extLst>
+          </p:cNvPr>
+          <p:cNvSpPr>
+            <a:spLocks noGrp="1"/>
+          </p:cNvSpPr>
+          <p:nvPr>
+            <p:ph type="title"/>
+          </p:nvPr>
+        </p:nvSpPr>
+        <p:spPr>
+          <a:xfrm>
+            <a:off x="677334" y="609601"/>
+            <a:ext cx="8596668" cy="1565188"/>
+          </a:xfrm>
+        </p:spPr>
+        <p:txBody>
+          <a:bodyPr>
+            <a:normAutofit fontScale="90000"/>
+          </a:bodyPr>
+          <a:lstStyle/>
+          <a:p>
+            <a:pPr algn="ctr"/>
+            <a:r>
+              <a:rPr lang="en-US" b="1" dirty="0"/>
+              <a:t>INSIGHT FROM ACCOUNTS WITH THE HIGHEST ORDERS AMOUNT FROM WEB EVENTS</a:t>
+            </a:r>
+          </a:p>
+        </p:txBody>
+      </p:sp>
+      <p:sp>
+        <p:nvSpPr>
+          <p:cNvPr id="3" name="Content Placeholder 2">
+            <a:extLst>
+              <a:ext uri="{FF2B5EF4-FFF2-40B4-BE49-F238E27FC236}">
+                <a16:creationId xmlns:a16="http://schemas.microsoft.com/office/drawing/2014/main" id="{7E6F698F-F453-06A5-F60F-3D960F38F2F9}"/>
+              </a:ext>
+            </a:extLst>
+          </p:cNvPr>
+          <p:cNvSpPr>
+            <a:spLocks noGrp="1"/>
+          </p:cNvSpPr>
+          <p:nvPr>
+            <p:ph idx="1"/>
+          </p:nvPr>
+        </p:nvSpPr>
+        <p:spPr>
+          <a:xfrm>
+            <a:off x="677334" y="2174789"/>
+            <a:ext cx="8596668" cy="4312508"/>
+          </a:xfrm>
+        </p:spPr>
+        <p:txBody>
+          <a:bodyPr>
+            <a:normAutofit/>
+          </a:bodyPr>
+          <a:lstStyle/>
+          <a:p>
+            <a:pPr algn="just"/>
+            <a:r>
+              <a:rPr lang="en-US" dirty="0"/>
+              <a:t>EOG Resources stands out as the single most valuable customer, with a total order amount of over $34 million. While their number of web events (5,518) is not significantly higher than the others on the list, their spending is in a class of its own. This indicates that their orders are of a much larger average size or value compared to the other top accounts.</a:t>
+            </a:r>
+          </a:p>
+          <a:p>
+            <a:pPr algn="just"/>
+            <a:r>
+              <a:rPr lang="en-US" dirty="0"/>
+              <a:t>The accounts </a:t>
+            </a:r>
+            <a:r>
+              <a:rPr lang="en-US" b="1" dirty="0"/>
+              <a:t>Mosaic</a:t>
+            </a:r>
+            <a:r>
+              <a:rPr lang="en-US" dirty="0"/>
+              <a:t>, </a:t>
+            </a:r>
+            <a:r>
+              <a:rPr lang="en-US" b="1" dirty="0"/>
+              <a:t>General Dynamics</a:t>
+            </a:r>
+            <a:r>
+              <a:rPr lang="en-US" dirty="0"/>
+              <a:t>, </a:t>
+            </a:r>
+            <a:r>
+              <a:rPr lang="en-US" b="1" dirty="0"/>
+              <a:t>Leucadia National</a:t>
+            </a:r>
+            <a:r>
+              <a:rPr lang="en-US" dirty="0"/>
+              <a:t>, and </a:t>
+            </a:r>
+            <a:r>
+              <a:rPr lang="en-US" b="1" dirty="0"/>
+              <a:t>Arrow Electronics</a:t>
+            </a:r>
+            <a:r>
+              <a:rPr lang="en-US" dirty="0"/>
+              <a:t> all show a similar pattern:</a:t>
+            </a:r>
+          </a:p>
+          <a:p>
+            <a:pPr lvl="1" algn="just"/>
+            <a:r>
+              <a:rPr lang="en-US" dirty="0"/>
+              <a:t>Their total order amounts are all in the range of </a:t>
+            </a:r>
+            <a:r>
+              <a:rPr lang="en-US" b="1" dirty="0"/>
+              <a:t>$21 million to $28 million</a:t>
+            </a:r>
+            <a:r>
+              <a:rPr lang="en-US" dirty="0"/>
+              <a:t>.</a:t>
+            </a:r>
+          </a:p>
+          <a:p>
+            <a:pPr lvl="1" algn="just"/>
+            <a:r>
+              <a:rPr lang="en-US" dirty="0"/>
+              <a:t>Their number of web events are also closely clustered, ranging from just over 5,000 to just under 5,500.</a:t>
+            </a:r>
+          </a:p>
+          <a:p>
+            <a:pPr algn="just"/>
+            <a:r>
+              <a:rPr lang="en-US" dirty="0"/>
+              <a:t>This suggests that these are all major, high-value clients with a similar buying and engagement behavior. They are very active online and generate significant revenue.</a:t>
+            </a:r>
+          </a:p>
+          <a:p>
+            <a:pPr algn="just"/>
+            <a:endParaRPr lang="en-US" dirty="0"/>
+          </a:p>
+          <a:p>
+            <a:pPr algn="just"/>
+            <a:endParaRPr lang="en-US" dirty="0"/>
+          </a:p>
+        </p:txBody>
+      </p:sp>
+    </p:spTree>
+    <p:extLst>
+      <p:ext uri="{BB962C8B-B14F-4D97-AF65-F5344CB8AC3E}">
+        <p14:creationId xmlns:p14="http://schemas.microsoft.com/office/powerpoint/2010/main" val="1335898808"/>
+      </p:ext>
+    </p:extLst>
+  </p:cSld>
+  <p:clrMapOvr>
+    <a:masterClrMapping/>
+  </p:clrMapOvr>
+</p:sld>
+</file>
+
+<file path=ppt/slides/slide8.xml><?xml version="1.0" encoding="utf-8"?>
+<p:sld xmlns:a="http://schemas.openxmlformats.org/drawingml/2006/main" xmlns:r="http://schemas.openxmlformats.org/officeDocument/2006/relationships" xmlns:p="http://schemas.openxmlformats.org/presentationml/2006/main">
+  <p:cSld>
+    <p:spTree>
+      <p:nvGrpSpPr>
+        <p:cNvPr id="1" name=""/>
+        <p:cNvGrpSpPr/>
+        <p:nvPr/>
+      </p:nvGrpSpPr>
+      <p:grpSpPr>
+        <a:xfrm>
+          <a:off x="0" y="0"/>
+          <a:ext cx="0" cy="0"/>
+          <a:chOff x="0" y="0"/>
+          <a:chExt cx="0" cy="0"/>
+        </a:xfrm>
+      </p:grpSpPr>
+      <p:sp>
+        <p:nvSpPr>
+          <p:cNvPr id="2" name="Title 1">
+            <a:extLst>
+              <a:ext uri="{FF2B5EF4-FFF2-40B4-BE49-F238E27FC236}">
+                <a16:creationId xmlns:a16="http://schemas.microsoft.com/office/drawing/2014/main" id="{8E9F4F62-B258-26F5-F0E7-8E8DB94C5BF3}"/>
+              </a:ext>
+            </a:extLst>
+          </p:cNvPr>
+          <p:cNvSpPr>
+            <a:spLocks noGrp="1"/>
+          </p:cNvSpPr>
+          <p:nvPr>
+            <p:ph type="title"/>
+          </p:nvPr>
+        </p:nvSpPr>
+        <p:spPr>
+          <a:xfrm>
+            <a:off x="677334" y="609600"/>
+            <a:ext cx="8596668" cy="811427"/>
+          </a:xfrm>
+        </p:spPr>
+        <p:txBody>
+          <a:bodyPr/>
+          <a:lstStyle/>
+          <a:p>
+            <a:r>
+              <a:rPr lang="en-US" b="1" dirty="0"/>
+              <a:t>HIGH VALUE ACCOUNTS </a:t>
+            </a:r>
+          </a:p>
+        </p:txBody>
+      </p:sp>
+      <p:pic>
+        <p:nvPicPr>
+          <p:cNvPr id="5" name="Content Placeholder 4">
+            <a:extLst>
+              <a:ext uri="{FF2B5EF4-FFF2-40B4-BE49-F238E27FC236}">
+                <a16:creationId xmlns:a16="http://schemas.microsoft.com/office/drawing/2014/main" id="{E12320CC-6629-BB46-E7A1-B1C5F8413583}"/>
+              </a:ext>
+            </a:extLst>
+          </p:cNvPr>
+          <p:cNvPicPr>
+            <a:picLocks noGrp="1" noChangeAspect="1"/>
+          </p:cNvPicPr>
+          <p:nvPr>
+            <p:ph idx="1"/>
+          </p:nvPr>
+        </p:nvPicPr>
+        <p:blipFill>
+          <a:blip r:embed="rId2"/>
+          <a:stretch>
+            <a:fillRect/>
+          </a:stretch>
+        </p:blipFill>
+        <p:spPr>
+          <a:xfrm>
+            <a:off x="398912" y="1705232"/>
+            <a:ext cx="9376160" cy="3867665"/>
+          </a:xfrm>
+        </p:spPr>
+      </p:pic>
+    </p:spTree>
+    <p:extLst>
+      <p:ext uri="{BB962C8B-B14F-4D97-AF65-F5344CB8AC3E}">
+        <p14:creationId xmlns:p14="http://schemas.microsoft.com/office/powerpoint/2010/main" val="890168431"/>
+      </p:ext>
+    </p:extLst>
+  </p:cSld>
+  <p:clrMapOvr>
+    <a:masterClrMapping/>
+  </p:clrMapOvr>
+</p:sld>
+</file>
+
+<file path=ppt/slides/slide9.xml><?xml version="1.0" encoding="utf-8"?>
+<p:sld xmlns:a="http://schemas.openxmlformats.org/drawingml/2006/main" xmlns:r="http://schemas.openxmlformats.org/officeDocument/2006/relationships" xmlns:p="http://schemas.openxmlformats.org/presentationml/2006/main">
+  <p:cSld>
+    <p:spTree>
+      <p:nvGrpSpPr>
+        <p:cNvPr id="1" name=""/>
+        <p:cNvGrpSpPr/>
+        <p:nvPr/>
+      </p:nvGrpSpPr>
+      <p:grpSpPr>
+        <a:xfrm>
+          <a:off x="0" y="0"/>
+          <a:ext cx="0" cy="0"/>
+          <a:chOff x="0" y="0"/>
+          <a:chExt cx="0" cy="0"/>
+        </a:xfrm>
+      </p:grpSpPr>
+      <p:sp>
+        <p:nvSpPr>
+          <p:cNvPr id="2" name="Title 1">
+            <a:extLst>
+              <a:ext uri="{FF2B5EF4-FFF2-40B4-BE49-F238E27FC236}">
                 <a16:creationId xmlns:a16="http://schemas.microsoft.com/office/drawing/2014/main" id="{67C4EC87-3F5C-0A22-C9AB-5C9F36AFD586}"/>
               </a:ext>
             </a:extLst>
@@ -6437,7 +6818,7 @@
           <a:lstStyle/>
           <a:p>
             <a:r>
-              <a:rPr lang="en-US" dirty="0"/>
+              <a:rPr lang="en-US" b="1" dirty="0"/>
               <a:t>HIGH VALUE ACCOUNTS </a:t>
             </a:r>
           </a:p>

</xml_diff>